<commit_message>
mostly working with seedling plot AICc analysis
</commit_message>
<xml_diff>
--- a/Figures and Graphs/figures/methods diagrams.pptx
+++ b/Figures and Graphs/figures/methods diagrams.pptx
@@ -123,6 +123,10 @@
 </p:presentation>
 </file>
 
+<file path=ppt/revisionInfo.xml><?xml version="1.0" encoding="utf-8"?>
+<p1510:revInfo xmlns:a="http://schemas.openxmlformats.org/drawingml/2006/main" xmlns:r="http://schemas.openxmlformats.org/officeDocument/2006/relationships" xmlns:p1510="http://schemas.microsoft.com/office/powerpoint/2015/10/main"/>
+</file>
+
 <file path=ppt/slideLayouts/slideLayout1.xml><?xml version="1.0" encoding="utf-8"?>
 <p:sldLayout xmlns:a="http://schemas.openxmlformats.org/drawingml/2006/main" xmlns:r="http://schemas.openxmlformats.org/officeDocument/2006/relationships" xmlns:p="http://schemas.openxmlformats.org/presentationml/2006/main" type="title" preserve="1">
   <p:cSld name="Title Slide">
@@ -303,7 +307,7 @@
             <a:fld id="{C9CE8FD2-FA75-6843-BC58-D1AA14352EDB}" type="datetimeFigureOut">
               <a:rPr lang="en-US" smtClean="0"/>
               <a:pPr/>
-              <a:t>5/24/2017</a:t>
+              <a:t>9/27/2017</a:t>
             </a:fld>
             <a:endParaRPr lang="en-US"/>
           </a:p>
@@ -468,7 +472,7 @@
             <a:fld id="{C9CE8FD2-FA75-6843-BC58-D1AA14352EDB}" type="datetimeFigureOut">
               <a:rPr lang="en-US" smtClean="0"/>
               <a:pPr/>
-              <a:t>5/24/2017</a:t>
+              <a:t>9/27/2017</a:t>
             </a:fld>
             <a:endParaRPr lang="en-US"/>
           </a:p>
@@ -643,7 +647,7 @@
             <a:fld id="{C9CE8FD2-FA75-6843-BC58-D1AA14352EDB}" type="datetimeFigureOut">
               <a:rPr lang="en-US" smtClean="0"/>
               <a:pPr/>
-              <a:t>5/24/2017</a:t>
+              <a:t>9/27/2017</a:t>
             </a:fld>
             <a:endParaRPr lang="en-US"/>
           </a:p>
@@ -808,7 +812,7 @@
             <a:fld id="{C9CE8FD2-FA75-6843-BC58-D1AA14352EDB}" type="datetimeFigureOut">
               <a:rPr lang="en-US" smtClean="0"/>
               <a:pPr/>
-              <a:t>5/24/2017</a:t>
+              <a:t>9/27/2017</a:t>
             </a:fld>
             <a:endParaRPr lang="en-US"/>
           </a:p>
@@ -1050,7 +1054,7 @@
             <a:fld id="{C9CE8FD2-FA75-6843-BC58-D1AA14352EDB}" type="datetimeFigureOut">
               <a:rPr lang="en-US" smtClean="0"/>
               <a:pPr/>
-              <a:t>5/24/2017</a:t>
+              <a:t>9/27/2017</a:t>
             </a:fld>
             <a:endParaRPr lang="en-US"/>
           </a:p>
@@ -1332,7 +1336,7 @@
             <a:fld id="{C9CE8FD2-FA75-6843-BC58-D1AA14352EDB}" type="datetimeFigureOut">
               <a:rPr lang="en-US" smtClean="0"/>
               <a:pPr/>
-              <a:t>5/24/2017</a:t>
+              <a:t>9/27/2017</a:t>
             </a:fld>
             <a:endParaRPr lang="en-US"/>
           </a:p>
@@ -1748,7 +1752,7 @@
             <a:fld id="{C9CE8FD2-FA75-6843-BC58-D1AA14352EDB}" type="datetimeFigureOut">
               <a:rPr lang="en-US" smtClean="0"/>
               <a:pPr/>
-              <a:t>5/24/2017</a:t>
+              <a:t>9/27/2017</a:t>
             </a:fld>
             <a:endParaRPr lang="en-US"/>
           </a:p>
@@ -1862,7 +1866,7 @@
             <a:fld id="{C9CE8FD2-FA75-6843-BC58-D1AA14352EDB}" type="datetimeFigureOut">
               <a:rPr lang="en-US" smtClean="0"/>
               <a:pPr/>
-              <a:t>5/24/2017</a:t>
+              <a:t>9/27/2017</a:t>
             </a:fld>
             <a:endParaRPr lang="en-US"/>
           </a:p>
@@ -1954,7 +1958,7 @@
             <a:fld id="{C9CE8FD2-FA75-6843-BC58-D1AA14352EDB}" type="datetimeFigureOut">
               <a:rPr lang="en-US" smtClean="0"/>
               <a:pPr/>
-              <a:t>5/24/2017</a:t>
+              <a:t>9/27/2017</a:t>
             </a:fld>
             <a:endParaRPr lang="en-US"/>
           </a:p>
@@ -2226,7 +2230,7 @@
             <a:fld id="{C9CE8FD2-FA75-6843-BC58-D1AA14352EDB}" type="datetimeFigureOut">
               <a:rPr lang="en-US" smtClean="0"/>
               <a:pPr/>
-              <a:t>5/24/2017</a:t>
+              <a:t>9/27/2017</a:t>
             </a:fld>
             <a:endParaRPr lang="en-US"/>
           </a:p>
@@ -2475,7 +2479,7 @@
             <a:fld id="{C9CE8FD2-FA75-6843-BC58-D1AA14352EDB}" type="datetimeFigureOut">
               <a:rPr lang="en-US" smtClean="0"/>
               <a:pPr/>
-              <a:t>5/24/2017</a:t>
+              <a:t>9/27/2017</a:t>
             </a:fld>
             <a:endParaRPr lang="en-US"/>
           </a:p>
@@ -2683,7 +2687,7 @@
             <a:fld id="{C9CE8FD2-FA75-6843-BC58-D1AA14352EDB}" type="datetimeFigureOut">
               <a:rPr lang="en-US" smtClean="0"/>
               <a:pPr/>
-              <a:t>5/24/2017</a:t>
+              <a:t>9/27/2017</a:t>
             </a:fld>
             <a:endParaRPr lang="en-US"/>
           </a:p>
@@ -3105,7 +3109,7 @@
         <p:spPr>
           <a:xfrm>
             <a:off x="6680324" y="1852169"/>
-            <a:ext cx="4931754" cy="369332"/>
+            <a:ext cx="4931754" cy="1200329"/>
           </a:xfrm>
           <a:prstGeom prst="rect">
             <a:avLst/>
@@ -3133,6 +3137,36 @@
                 <a:cs typeface="Arial" panose="020B0604020202020204" pitchFamily="34" charset="0"/>
               </a:rPr>
               <a:t>100-m x 1-m belt vegetation transect</a:t>
+            </a:r>
+          </a:p>
+          <a:p>
+            <a:endParaRPr lang="en-US" dirty="0">
+              <a:solidFill>
+                <a:srgbClr val="00B050"/>
+              </a:solidFill>
+              <a:latin typeface="Arial" panose="020B0604020202020204" pitchFamily="34" charset="0"/>
+              <a:cs typeface="Arial" panose="020B0604020202020204" pitchFamily="34" charset="0"/>
+            </a:endParaRPr>
+          </a:p>
+          <a:p>
+            <a:endParaRPr lang="en-US" dirty="0">
+              <a:solidFill>
+                <a:srgbClr val="00B050"/>
+              </a:solidFill>
+              <a:latin typeface="Arial" panose="020B0604020202020204" pitchFamily="34" charset="0"/>
+              <a:cs typeface="Arial" panose="020B0604020202020204" pitchFamily="34" charset="0"/>
+            </a:endParaRPr>
+          </a:p>
+          <a:p>
+            <a:r>
+              <a:rPr lang="en-US" dirty="0">
+                <a:solidFill>
+                  <a:srgbClr val="00B050"/>
+                </a:solidFill>
+                <a:latin typeface="Arial" panose="020B0604020202020204" pitchFamily="34" charset="0"/>
+                <a:cs typeface="Arial" panose="020B0604020202020204" pitchFamily="34" charset="0"/>
+              </a:rPr>
+              <a:t>100-m x 2-m belt transect for scat counts</a:t>
             </a:r>
           </a:p>
         </p:txBody>

</xml_diff>